<commit_message>
Chapter 6 done :dancer:
</commit_message>
<xml_diff>
--- a/assets/pp files/Gan Scheme.pptx
+++ b/assets/pp files/Gan Scheme.pptx
@@ -6,6 +6,7 @@
   </p:sldMasterIdLst>
   <p:sldIdLst>
     <p:sldId id="256" r:id="rId2"/>
+    <p:sldId id="257" r:id="rId3"/>
   </p:sldIdLst>
   <p:sldSz cx="12192000" cy="6858000"/>
   <p:notesSz cx="6858000" cy="9144000"/>
@@ -259,7 +260,7 @@
           <a:p>
             <a:fld id="{5E8E07B3-5178-8247-8C50-B5AC62A45C25}" type="datetimeFigureOut">
               <a:rPr lang="en-US" smtClean="0"/>
-              <a:t>5/12/18</a:t>
+              <a:t>5/14/18</a:t>
             </a:fld>
             <a:endParaRPr lang="en-US"/>
           </a:p>
@@ -457,7 +458,7 @@
           <a:p>
             <a:fld id="{5E8E07B3-5178-8247-8C50-B5AC62A45C25}" type="datetimeFigureOut">
               <a:rPr lang="en-US" smtClean="0"/>
-              <a:t>5/12/18</a:t>
+              <a:t>5/14/18</a:t>
             </a:fld>
             <a:endParaRPr lang="en-US"/>
           </a:p>
@@ -665,7 +666,7 @@
           <a:p>
             <a:fld id="{5E8E07B3-5178-8247-8C50-B5AC62A45C25}" type="datetimeFigureOut">
               <a:rPr lang="en-US" smtClean="0"/>
-              <a:t>5/12/18</a:t>
+              <a:t>5/14/18</a:t>
             </a:fld>
             <a:endParaRPr lang="en-US"/>
           </a:p>
@@ -863,7 +864,7 @@
           <a:p>
             <a:fld id="{5E8E07B3-5178-8247-8C50-B5AC62A45C25}" type="datetimeFigureOut">
               <a:rPr lang="en-US" smtClean="0"/>
-              <a:t>5/12/18</a:t>
+              <a:t>5/14/18</a:t>
             </a:fld>
             <a:endParaRPr lang="en-US"/>
           </a:p>
@@ -1138,7 +1139,7 @@
           <a:p>
             <a:fld id="{5E8E07B3-5178-8247-8C50-B5AC62A45C25}" type="datetimeFigureOut">
               <a:rPr lang="en-US" smtClean="0"/>
-              <a:t>5/12/18</a:t>
+              <a:t>5/14/18</a:t>
             </a:fld>
             <a:endParaRPr lang="en-US"/>
           </a:p>
@@ -1403,7 +1404,7 @@
           <a:p>
             <a:fld id="{5E8E07B3-5178-8247-8C50-B5AC62A45C25}" type="datetimeFigureOut">
               <a:rPr lang="en-US" smtClean="0"/>
-              <a:t>5/12/18</a:t>
+              <a:t>5/14/18</a:t>
             </a:fld>
             <a:endParaRPr lang="en-US"/>
           </a:p>
@@ -1815,7 +1816,7 @@
           <a:p>
             <a:fld id="{5E8E07B3-5178-8247-8C50-B5AC62A45C25}" type="datetimeFigureOut">
               <a:rPr lang="en-US" smtClean="0"/>
-              <a:t>5/12/18</a:t>
+              <a:t>5/14/18</a:t>
             </a:fld>
             <a:endParaRPr lang="en-US"/>
           </a:p>
@@ -1956,7 +1957,7 @@
           <a:p>
             <a:fld id="{5E8E07B3-5178-8247-8C50-B5AC62A45C25}" type="datetimeFigureOut">
               <a:rPr lang="en-US" smtClean="0"/>
-              <a:t>5/12/18</a:t>
+              <a:t>5/14/18</a:t>
             </a:fld>
             <a:endParaRPr lang="en-US"/>
           </a:p>
@@ -2069,7 +2070,7 @@
           <a:p>
             <a:fld id="{5E8E07B3-5178-8247-8C50-B5AC62A45C25}" type="datetimeFigureOut">
               <a:rPr lang="en-US" smtClean="0"/>
-              <a:t>5/12/18</a:t>
+              <a:t>5/14/18</a:t>
             </a:fld>
             <a:endParaRPr lang="en-US"/>
           </a:p>
@@ -2380,7 +2381,7 @@
           <a:p>
             <a:fld id="{5E8E07B3-5178-8247-8C50-B5AC62A45C25}" type="datetimeFigureOut">
               <a:rPr lang="en-US" smtClean="0"/>
-              <a:t>5/12/18</a:t>
+              <a:t>5/14/18</a:t>
             </a:fld>
             <a:endParaRPr lang="en-US"/>
           </a:p>
@@ -2668,7 +2669,7 @@
           <a:p>
             <a:fld id="{5E8E07B3-5178-8247-8C50-B5AC62A45C25}" type="datetimeFigureOut">
               <a:rPr lang="en-US" smtClean="0"/>
-              <a:t>5/12/18</a:t>
+              <a:t>5/14/18</a:t>
             </a:fld>
             <a:endParaRPr lang="en-US"/>
           </a:p>
@@ -2909,7 +2910,7 @@
           <a:p>
             <a:fld id="{5E8E07B3-5178-8247-8C50-B5AC62A45C25}" type="datetimeFigureOut">
               <a:rPr lang="en-US" smtClean="0"/>
-              <a:t>5/12/18</a:t>
+              <a:t>5/14/18</a:t>
             </a:fld>
             <a:endParaRPr lang="en-US"/>
           </a:p>
@@ -3930,6 +3931,929 @@
 </p:sld>
 </file>
 
+<file path=ppt/slides/slide2.xml><?xml version="1.0" encoding="utf-8"?>
+<p:sld xmlns:a="http://schemas.openxmlformats.org/drawingml/2006/main" xmlns:r="http://schemas.openxmlformats.org/officeDocument/2006/relationships" xmlns:p="http://schemas.openxmlformats.org/presentationml/2006/main">
+  <p:cSld>
+    <p:spTree>
+      <p:nvGrpSpPr>
+        <p:cNvPr id="1" name=""/>
+        <p:cNvGrpSpPr/>
+        <p:nvPr/>
+      </p:nvGrpSpPr>
+      <p:grpSpPr>
+        <a:xfrm>
+          <a:off x="0" y="0"/>
+          <a:ext cx="0" cy="0"/>
+          <a:chOff x="0" y="0"/>
+          <a:chExt cx="0" cy="0"/>
+        </a:xfrm>
+      </p:grpSpPr>
+      <p:sp>
+        <p:nvSpPr>
+          <p:cNvPr id="4" name="Rectangle 3">
+            <a:extLst>
+              <a:ext uri="{FF2B5EF4-FFF2-40B4-BE49-F238E27FC236}">
+                <a16:creationId xmlns:a16="http://schemas.microsoft.com/office/drawing/2014/main" id="{328DB78A-B1E3-8743-B574-54D15BCAFD47}"/>
+              </a:ext>
+            </a:extLst>
+          </p:cNvPr>
+          <p:cNvSpPr/>
+          <p:nvPr/>
+        </p:nvSpPr>
+        <p:spPr>
+          <a:xfrm>
+            <a:off x="2218916" y="4640157"/>
+            <a:ext cx="2194560" cy="1828800"/>
+          </a:xfrm>
+          <a:prstGeom prst="rect">
+            <a:avLst/>
+          </a:prstGeom>
+          <a:solidFill>
+            <a:schemeClr val="tx1"/>
+          </a:solidFill>
+          <a:ln>
+            <a:solidFill>
+              <a:schemeClr val="tx1"/>
+            </a:solidFill>
+          </a:ln>
+        </p:spPr>
+        <p:style>
+          <a:lnRef idx="2">
+            <a:schemeClr val="accent1">
+              <a:shade val="50000"/>
+            </a:schemeClr>
+          </a:lnRef>
+          <a:fillRef idx="1">
+            <a:schemeClr val="accent1"/>
+          </a:fillRef>
+          <a:effectRef idx="0">
+            <a:schemeClr val="accent1"/>
+          </a:effectRef>
+          <a:fontRef idx="minor">
+            <a:schemeClr val="lt1"/>
+          </a:fontRef>
+        </p:style>
+        <p:txBody>
+          <a:bodyPr rtlCol="0" anchor="ctr"/>
+          <a:lstStyle/>
+          <a:p>
+            <a:pPr algn="ctr"/>
+            <a:r>
+              <a:rPr lang="en-US" sz="2400" dirty="0">
+                <a:latin typeface="Lato" panose="020F0502020204030203" pitchFamily="34" charset="0"/>
+                <a:ea typeface="Lato" panose="020F0502020204030203" pitchFamily="34" charset="0"/>
+                <a:cs typeface="Lato" panose="020F0502020204030203" pitchFamily="34" charset="0"/>
+              </a:rPr>
+              <a:t>Generator</a:t>
+            </a:r>
+          </a:p>
+        </p:txBody>
+      </p:sp>
+      <p:sp>
+        <p:nvSpPr>
+          <p:cNvPr id="5" name="Rectangle 4">
+            <a:extLst>
+              <a:ext uri="{FF2B5EF4-FFF2-40B4-BE49-F238E27FC236}">
+                <a16:creationId xmlns:a16="http://schemas.microsoft.com/office/drawing/2014/main" id="{4057981A-06AE-CD46-87A2-DF96EFC32EC4}"/>
+              </a:ext>
+            </a:extLst>
+          </p:cNvPr>
+          <p:cNvSpPr/>
+          <p:nvPr/>
+        </p:nvSpPr>
+        <p:spPr>
+          <a:xfrm>
+            <a:off x="6031206" y="2407315"/>
+            <a:ext cx="2194560" cy="1828800"/>
+          </a:xfrm>
+          <a:prstGeom prst="rect">
+            <a:avLst/>
+          </a:prstGeom>
+          <a:solidFill>
+            <a:schemeClr val="tx1"/>
+          </a:solidFill>
+          <a:ln>
+            <a:solidFill>
+              <a:schemeClr val="tx1"/>
+            </a:solidFill>
+          </a:ln>
+        </p:spPr>
+        <p:style>
+          <a:lnRef idx="2">
+            <a:schemeClr val="accent1">
+              <a:shade val="50000"/>
+            </a:schemeClr>
+          </a:lnRef>
+          <a:fillRef idx="1">
+            <a:schemeClr val="accent1"/>
+          </a:fillRef>
+          <a:effectRef idx="0">
+            <a:schemeClr val="accent1"/>
+          </a:effectRef>
+          <a:fontRef idx="minor">
+            <a:schemeClr val="lt1"/>
+          </a:fontRef>
+        </p:style>
+        <p:txBody>
+          <a:bodyPr rtlCol="0" anchor="ctr"/>
+          <a:lstStyle/>
+          <a:p>
+            <a:pPr algn="ctr"/>
+            <a:r>
+              <a:rPr lang="en-US" sz="2400" dirty="0">
+                <a:latin typeface="Lato" panose="020F0502020204030203" pitchFamily="34" charset="0"/>
+                <a:ea typeface="Lato" panose="020F0502020204030203" pitchFamily="34" charset="0"/>
+                <a:cs typeface="Lato" panose="020F0502020204030203" pitchFamily="34" charset="0"/>
+              </a:rPr>
+              <a:t>Discriminator</a:t>
+            </a:r>
+          </a:p>
+        </p:txBody>
+      </p:sp>
+      <p:sp>
+        <p:nvSpPr>
+          <p:cNvPr id="6" name="Oval 5">
+            <a:extLst>
+              <a:ext uri="{FF2B5EF4-FFF2-40B4-BE49-F238E27FC236}">
+                <a16:creationId xmlns:a16="http://schemas.microsoft.com/office/drawing/2014/main" id="{07C24B95-25F8-D746-9B82-F09197F3C374}"/>
+              </a:ext>
+            </a:extLst>
+          </p:cNvPr>
+          <p:cNvSpPr/>
+          <p:nvPr/>
+        </p:nvSpPr>
+        <p:spPr>
+          <a:xfrm>
+            <a:off x="755876" y="413289"/>
+            <a:ext cx="1828800" cy="1828800"/>
+          </a:xfrm>
+          <a:prstGeom prst="ellipse">
+            <a:avLst/>
+          </a:prstGeom>
+          <a:solidFill>
+            <a:schemeClr val="tx1"/>
+          </a:solidFill>
+          <a:ln>
+            <a:solidFill>
+              <a:schemeClr val="tx1"/>
+            </a:solidFill>
+          </a:ln>
+        </p:spPr>
+        <p:style>
+          <a:lnRef idx="2">
+            <a:schemeClr val="accent1">
+              <a:shade val="50000"/>
+            </a:schemeClr>
+          </a:lnRef>
+          <a:fillRef idx="1">
+            <a:schemeClr val="accent1"/>
+          </a:fillRef>
+          <a:effectRef idx="0">
+            <a:schemeClr val="accent1"/>
+          </a:effectRef>
+          <a:fontRef idx="minor">
+            <a:schemeClr val="lt1"/>
+          </a:fontRef>
+        </p:style>
+        <p:txBody>
+          <a:bodyPr rtlCol="0" anchor="ctr"/>
+          <a:lstStyle/>
+          <a:p>
+            <a:pPr algn="ctr"/>
+            <a:r>
+              <a:rPr lang="en-US" sz="2400" dirty="0">
+                <a:latin typeface="Lato" panose="020F0502020204030203" pitchFamily="34" charset="0"/>
+                <a:ea typeface="Lato" panose="020F0502020204030203" pitchFamily="34" charset="0"/>
+                <a:cs typeface="Lato" panose="020F0502020204030203" pitchFamily="34" charset="0"/>
+              </a:rPr>
+              <a:t>Real Data</a:t>
+            </a:r>
+          </a:p>
+        </p:txBody>
+      </p:sp>
+      <p:cxnSp>
+        <p:nvCxnSpPr>
+          <p:cNvPr id="8" name="Elbow Connector 7">
+            <a:extLst>
+              <a:ext uri="{FF2B5EF4-FFF2-40B4-BE49-F238E27FC236}">
+                <a16:creationId xmlns:a16="http://schemas.microsoft.com/office/drawing/2014/main" id="{1981AA2B-4617-6A42-A76F-AEEEA5F6A0D4}"/>
+              </a:ext>
+            </a:extLst>
+          </p:cNvPr>
+          <p:cNvCxnSpPr>
+            <a:cxnSpLocks/>
+            <a:stCxn id="6" idx="6"/>
+            <a:endCxn id="5" idx="0"/>
+          </p:cNvCxnSpPr>
+          <p:nvPr/>
+        </p:nvCxnSpPr>
+        <p:spPr>
+          <a:xfrm>
+            <a:off x="2584676" y="1327689"/>
+            <a:ext cx="4543810" cy="1079626"/>
+          </a:xfrm>
+          <a:prstGeom prst="bentConnector2">
+            <a:avLst/>
+          </a:prstGeom>
+          <a:ln w="101600">
+            <a:solidFill>
+              <a:schemeClr val="tx1"/>
+            </a:solidFill>
+            <a:tailEnd type="triangle"/>
+          </a:ln>
+        </p:spPr>
+        <p:style>
+          <a:lnRef idx="1">
+            <a:schemeClr val="accent1"/>
+          </a:lnRef>
+          <a:fillRef idx="0">
+            <a:schemeClr val="accent1"/>
+          </a:fillRef>
+          <a:effectRef idx="0">
+            <a:schemeClr val="accent1"/>
+          </a:effectRef>
+          <a:fontRef idx="minor">
+            <a:schemeClr val="tx1"/>
+          </a:fontRef>
+        </p:style>
+      </p:cxnSp>
+      <p:cxnSp>
+        <p:nvCxnSpPr>
+          <p:cNvPr id="14" name="Elbow Connector 13">
+            <a:extLst>
+              <a:ext uri="{FF2B5EF4-FFF2-40B4-BE49-F238E27FC236}">
+                <a16:creationId xmlns:a16="http://schemas.microsoft.com/office/drawing/2014/main" id="{A0E41236-519C-0844-8CFD-6FFA1129149D}"/>
+              </a:ext>
+            </a:extLst>
+          </p:cNvPr>
+          <p:cNvCxnSpPr>
+            <a:cxnSpLocks/>
+            <a:stCxn id="4" idx="3"/>
+            <a:endCxn id="5" idx="2"/>
+          </p:cNvCxnSpPr>
+          <p:nvPr/>
+        </p:nvCxnSpPr>
+        <p:spPr>
+          <a:xfrm flipV="1">
+            <a:off x="4413476" y="4236115"/>
+            <a:ext cx="2715010" cy="1318442"/>
+          </a:xfrm>
+          <a:prstGeom prst="bentConnector2">
+            <a:avLst/>
+          </a:prstGeom>
+          <a:ln w="101600">
+            <a:solidFill>
+              <a:schemeClr val="tx1"/>
+            </a:solidFill>
+            <a:tailEnd type="triangle"/>
+          </a:ln>
+        </p:spPr>
+        <p:style>
+          <a:lnRef idx="1">
+            <a:schemeClr val="accent1"/>
+          </a:lnRef>
+          <a:fillRef idx="0">
+            <a:schemeClr val="accent1"/>
+          </a:fillRef>
+          <a:effectRef idx="0">
+            <a:schemeClr val="accent1"/>
+          </a:effectRef>
+          <a:fontRef idx="minor">
+            <a:schemeClr val="tx1"/>
+          </a:fontRef>
+        </p:style>
+      </p:cxnSp>
+      <p:cxnSp>
+        <p:nvCxnSpPr>
+          <p:cNvPr id="20" name="Elbow Connector 19">
+            <a:extLst>
+              <a:ext uri="{FF2B5EF4-FFF2-40B4-BE49-F238E27FC236}">
+                <a16:creationId xmlns:a16="http://schemas.microsoft.com/office/drawing/2014/main" id="{470B834B-C442-2E4B-86F6-624F49014842}"/>
+              </a:ext>
+            </a:extLst>
+          </p:cNvPr>
+          <p:cNvCxnSpPr>
+            <a:cxnSpLocks/>
+            <a:stCxn id="5" idx="1"/>
+            <a:endCxn id="4" idx="0"/>
+          </p:cNvCxnSpPr>
+          <p:nvPr/>
+        </p:nvCxnSpPr>
+        <p:spPr>
+          <a:xfrm rot="10800000" flipV="1">
+            <a:off x="3316196" y="3321715"/>
+            <a:ext cx="2715010" cy="1318442"/>
+          </a:xfrm>
+          <a:prstGeom prst="bentConnector2">
+            <a:avLst/>
+          </a:prstGeom>
+          <a:ln w="101600">
+            <a:solidFill>
+              <a:schemeClr val="tx1"/>
+            </a:solidFill>
+            <a:tailEnd type="triangle"/>
+          </a:ln>
+        </p:spPr>
+        <p:style>
+          <a:lnRef idx="1">
+            <a:schemeClr val="accent1"/>
+          </a:lnRef>
+          <a:fillRef idx="0">
+            <a:schemeClr val="accent1"/>
+          </a:fillRef>
+          <a:effectRef idx="0">
+            <a:schemeClr val="accent1"/>
+          </a:effectRef>
+          <a:fontRef idx="minor">
+            <a:schemeClr val="tx1"/>
+          </a:fontRef>
+        </p:style>
+      </p:cxnSp>
+      <p:sp>
+        <p:nvSpPr>
+          <p:cNvPr id="24" name="TextBox 23">
+            <a:extLst>
+              <a:ext uri="{FF2B5EF4-FFF2-40B4-BE49-F238E27FC236}">
+                <a16:creationId xmlns:a16="http://schemas.microsoft.com/office/drawing/2014/main" id="{31DF537D-E20D-DB43-8035-53A31A833FE1}"/>
+              </a:ext>
+            </a:extLst>
+          </p:cNvPr>
+          <p:cNvSpPr txBox="1"/>
+          <p:nvPr/>
+        </p:nvSpPr>
+        <p:spPr>
+          <a:xfrm>
+            <a:off x="4516272" y="858040"/>
+            <a:ext cx="1491114" cy="461665"/>
+          </a:xfrm>
+          <a:prstGeom prst="rect">
+            <a:avLst/>
+          </a:prstGeom>
+          <a:noFill/>
+        </p:spPr>
+        <p:txBody>
+          <a:bodyPr wrap="none" rtlCol="0">
+            <a:spAutoFit/>
+          </a:bodyPr>
+          <a:lstStyle/>
+          <a:p>
+            <a:pPr algn="ctr"/>
+            <a:r>
+              <a:rPr lang="en-US" sz="2400" dirty="0">
+                <a:latin typeface="Lato" panose="020F0502020204030203" pitchFamily="34" charset="0"/>
+                <a:ea typeface="Lato" panose="020F0502020204030203" pitchFamily="34" charset="0"/>
+                <a:cs typeface="Lato" panose="020F0502020204030203" pitchFamily="34" charset="0"/>
+              </a:rPr>
+              <a:t>Real Data</a:t>
+            </a:r>
+          </a:p>
+        </p:txBody>
+      </p:sp>
+      <p:sp>
+        <p:nvSpPr>
+          <p:cNvPr id="25" name="TextBox 24">
+            <a:extLst>
+              <a:ext uri="{FF2B5EF4-FFF2-40B4-BE49-F238E27FC236}">
+                <a16:creationId xmlns:a16="http://schemas.microsoft.com/office/drawing/2014/main" id="{F185BA0E-1DEE-AD49-82EA-1CBDCE4271CE}"/>
+              </a:ext>
+            </a:extLst>
+          </p:cNvPr>
+          <p:cNvSpPr txBox="1"/>
+          <p:nvPr/>
+        </p:nvSpPr>
+        <p:spPr>
+          <a:xfrm>
+            <a:off x="4516272" y="5084908"/>
+            <a:ext cx="1558440" cy="461665"/>
+          </a:xfrm>
+          <a:prstGeom prst="rect">
+            <a:avLst/>
+          </a:prstGeom>
+          <a:noFill/>
+        </p:spPr>
+        <p:txBody>
+          <a:bodyPr wrap="none" rtlCol="0">
+            <a:spAutoFit/>
+          </a:bodyPr>
+          <a:lstStyle/>
+          <a:p>
+            <a:pPr algn="ctr"/>
+            <a:r>
+              <a:rPr lang="en-US" sz="2400" dirty="0">
+                <a:latin typeface="Lato" panose="020F0502020204030203" pitchFamily="34" charset="0"/>
+                <a:ea typeface="Lato" panose="020F0502020204030203" pitchFamily="34" charset="0"/>
+                <a:cs typeface="Lato" panose="020F0502020204030203" pitchFamily="34" charset="0"/>
+              </a:rPr>
+              <a:t>Fake Data</a:t>
+            </a:r>
+          </a:p>
+        </p:txBody>
+      </p:sp>
+      <p:sp>
+        <p:nvSpPr>
+          <p:cNvPr id="26" name="TextBox 25">
+            <a:extLst>
+              <a:ext uri="{FF2B5EF4-FFF2-40B4-BE49-F238E27FC236}">
+                <a16:creationId xmlns:a16="http://schemas.microsoft.com/office/drawing/2014/main" id="{76491117-61DD-A943-9F7D-A5B7DF185F81}"/>
+              </a:ext>
+            </a:extLst>
+          </p:cNvPr>
+          <p:cNvSpPr txBox="1"/>
+          <p:nvPr/>
+        </p:nvSpPr>
+        <p:spPr>
+          <a:xfrm>
+            <a:off x="4546729" y="2876965"/>
+            <a:ext cx="1497526" cy="461665"/>
+          </a:xfrm>
+          <a:prstGeom prst="rect">
+            <a:avLst/>
+          </a:prstGeom>
+          <a:noFill/>
+        </p:spPr>
+        <p:txBody>
+          <a:bodyPr wrap="none" rtlCol="0">
+            <a:spAutoFit/>
+          </a:bodyPr>
+          <a:lstStyle/>
+          <a:p>
+            <a:pPr algn="ctr"/>
+            <a:r>
+              <a:rPr lang="en-US" sz="2400" dirty="0">
+                <a:latin typeface="Lato" panose="020F0502020204030203" pitchFamily="34" charset="0"/>
+                <a:ea typeface="Lato" panose="020F0502020204030203" pitchFamily="34" charset="0"/>
+                <a:cs typeface="Lato" panose="020F0502020204030203" pitchFamily="34" charset="0"/>
+              </a:rPr>
+              <a:t>Gradients</a:t>
+            </a:r>
+          </a:p>
+        </p:txBody>
+      </p:sp>
+      <p:sp>
+        <p:nvSpPr>
+          <p:cNvPr id="3" name="Rectangle 2">
+            <a:extLst>
+              <a:ext uri="{FF2B5EF4-FFF2-40B4-BE49-F238E27FC236}">
+                <a16:creationId xmlns:a16="http://schemas.microsoft.com/office/drawing/2014/main" id="{60C76DA1-541C-7C4E-BA82-7AAB6DF7D2AC}"/>
+              </a:ext>
+            </a:extLst>
+          </p:cNvPr>
+          <p:cNvSpPr/>
+          <p:nvPr/>
+        </p:nvSpPr>
+        <p:spPr>
+          <a:xfrm>
+            <a:off x="922514" y="4640156"/>
+            <a:ext cx="199122" cy="1828801"/>
+          </a:xfrm>
+          <a:prstGeom prst="rect">
+            <a:avLst/>
+          </a:prstGeom>
+          <a:solidFill>
+            <a:schemeClr val="tx1"/>
+          </a:solidFill>
+          <a:ln>
+            <a:solidFill>
+              <a:schemeClr val="tx1"/>
+            </a:solidFill>
+          </a:ln>
+        </p:spPr>
+        <p:style>
+          <a:lnRef idx="2">
+            <a:schemeClr val="accent1">
+              <a:shade val="50000"/>
+            </a:schemeClr>
+          </a:lnRef>
+          <a:fillRef idx="1">
+            <a:schemeClr val="accent1"/>
+          </a:fillRef>
+          <a:effectRef idx="0">
+            <a:schemeClr val="accent1"/>
+          </a:effectRef>
+          <a:fontRef idx="minor">
+            <a:schemeClr val="lt1"/>
+          </a:fontRef>
+        </p:style>
+        <p:txBody>
+          <a:bodyPr rtlCol="0" anchor="ctr"/>
+          <a:lstStyle/>
+          <a:p>
+            <a:pPr algn="ctr"/>
+            <a:endParaRPr lang="en-US"/>
+          </a:p>
+        </p:txBody>
+      </p:sp>
+      <p:cxnSp>
+        <p:nvCxnSpPr>
+          <p:cNvPr id="9" name="Straight Arrow Connector 8">
+            <a:extLst>
+              <a:ext uri="{FF2B5EF4-FFF2-40B4-BE49-F238E27FC236}">
+                <a16:creationId xmlns:a16="http://schemas.microsoft.com/office/drawing/2014/main" id="{001AF286-4680-464C-81AF-B836117F3BFD}"/>
+              </a:ext>
+            </a:extLst>
+          </p:cNvPr>
+          <p:cNvCxnSpPr>
+            <a:stCxn id="3" idx="3"/>
+            <a:endCxn id="4" idx="1"/>
+          </p:cNvCxnSpPr>
+          <p:nvPr/>
+        </p:nvCxnSpPr>
+        <p:spPr>
+          <a:xfrm>
+            <a:off x="1121636" y="5554557"/>
+            <a:ext cx="1097280" cy="0"/>
+          </a:xfrm>
+          <a:prstGeom prst="straightConnector1">
+            <a:avLst/>
+          </a:prstGeom>
+          <a:ln w="101600">
+            <a:solidFill>
+              <a:schemeClr val="tx1"/>
+            </a:solidFill>
+            <a:tailEnd type="triangle"/>
+          </a:ln>
+        </p:spPr>
+        <p:style>
+          <a:lnRef idx="1">
+            <a:schemeClr val="accent1"/>
+          </a:lnRef>
+          <a:fillRef idx="0">
+            <a:schemeClr val="accent1"/>
+          </a:fillRef>
+          <a:effectRef idx="0">
+            <a:schemeClr val="accent1"/>
+          </a:effectRef>
+          <a:fontRef idx="minor">
+            <a:schemeClr val="tx1"/>
+          </a:fontRef>
+        </p:style>
+      </p:cxnSp>
+      <p:sp>
+        <p:nvSpPr>
+          <p:cNvPr id="15" name="TextBox 14">
+            <a:extLst>
+              <a:ext uri="{FF2B5EF4-FFF2-40B4-BE49-F238E27FC236}">
+                <a16:creationId xmlns:a16="http://schemas.microsoft.com/office/drawing/2014/main" id="{34740704-84D3-7541-850C-A87F119A122D}"/>
+              </a:ext>
+            </a:extLst>
+          </p:cNvPr>
+          <p:cNvSpPr txBox="1"/>
+          <p:nvPr/>
+        </p:nvSpPr>
+        <p:spPr>
+          <a:xfrm>
+            <a:off x="99560" y="3565437"/>
+            <a:ext cx="2044149" cy="830997"/>
+          </a:xfrm>
+          <a:prstGeom prst="rect">
+            <a:avLst/>
+          </a:prstGeom>
+          <a:noFill/>
+        </p:spPr>
+        <p:txBody>
+          <a:bodyPr wrap="none" rtlCol="0">
+            <a:spAutoFit/>
+          </a:bodyPr>
+          <a:lstStyle/>
+          <a:p>
+            <a:pPr algn="ctr"/>
+            <a:r>
+              <a:rPr lang="en-US" sz="2400" dirty="0">
+                <a:latin typeface="Lato" panose="020F0502020204030203" pitchFamily="34" charset="0"/>
+                <a:ea typeface="Lato" panose="020F0502020204030203" pitchFamily="34" charset="0"/>
+                <a:cs typeface="Lato" panose="020F0502020204030203" pitchFamily="34" charset="0"/>
+              </a:rPr>
+              <a:t>Random </a:t>
+            </a:r>
+          </a:p>
+          <a:p>
+            <a:pPr algn="ctr"/>
+            <a:r>
+              <a:rPr lang="en-US" sz="2400" dirty="0">
+                <a:latin typeface="Lato" panose="020F0502020204030203" pitchFamily="34" charset="0"/>
+                <a:ea typeface="Lato" panose="020F0502020204030203" pitchFamily="34" charset="0"/>
+                <a:cs typeface="Lato" panose="020F0502020204030203" pitchFamily="34" charset="0"/>
+              </a:rPr>
+              <a:t>Latent Vector</a:t>
+            </a:r>
+          </a:p>
+        </p:txBody>
+      </p:sp>
+      <p:sp>
+        <p:nvSpPr>
+          <p:cNvPr id="22" name="Rectangle 21">
+            <a:extLst>
+              <a:ext uri="{FF2B5EF4-FFF2-40B4-BE49-F238E27FC236}">
+                <a16:creationId xmlns:a16="http://schemas.microsoft.com/office/drawing/2014/main" id="{9A766280-62E0-8648-A065-CA8FA7834639}"/>
+              </a:ext>
+            </a:extLst>
+          </p:cNvPr>
+          <p:cNvSpPr/>
+          <p:nvPr/>
+        </p:nvSpPr>
+        <p:spPr>
+          <a:xfrm>
+            <a:off x="9875323" y="405304"/>
+            <a:ext cx="199122" cy="1828801"/>
+          </a:xfrm>
+          <a:prstGeom prst="rect">
+            <a:avLst/>
+          </a:prstGeom>
+          <a:solidFill>
+            <a:schemeClr val="tx1"/>
+          </a:solidFill>
+          <a:ln>
+            <a:solidFill>
+              <a:schemeClr val="tx1"/>
+            </a:solidFill>
+          </a:ln>
+        </p:spPr>
+        <p:style>
+          <a:lnRef idx="2">
+            <a:schemeClr val="accent1">
+              <a:shade val="50000"/>
+            </a:schemeClr>
+          </a:lnRef>
+          <a:fillRef idx="1">
+            <a:schemeClr val="accent1"/>
+          </a:fillRef>
+          <a:effectRef idx="0">
+            <a:schemeClr val="accent1"/>
+          </a:effectRef>
+          <a:fontRef idx="minor">
+            <a:schemeClr val="lt1"/>
+          </a:fontRef>
+        </p:style>
+        <p:txBody>
+          <a:bodyPr rtlCol="0" anchor="ctr"/>
+          <a:lstStyle/>
+          <a:p>
+            <a:pPr algn="ctr"/>
+            <a:endParaRPr lang="en-US"/>
+          </a:p>
+        </p:txBody>
+      </p:sp>
+      <p:sp>
+        <p:nvSpPr>
+          <p:cNvPr id="23" name="Rectangle 22">
+            <a:extLst>
+              <a:ext uri="{FF2B5EF4-FFF2-40B4-BE49-F238E27FC236}">
+                <a16:creationId xmlns:a16="http://schemas.microsoft.com/office/drawing/2014/main" id="{AC4B02A5-4A0A-544C-A599-519659F14027}"/>
+              </a:ext>
+            </a:extLst>
+          </p:cNvPr>
+          <p:cNvSpPr/>
+          <p:nvPr/>
+        </p:nvSpPr>
+        <p:spPr>
+          <a:xfrm>
+            <a:off x="9863996" y="4640156"/>
+            <a:ext cx="199122" cy="1828801"/>
+          </a:xfrm>
+          <a:prstGeom prst="rect">
+            <a:avLst/>
+          </a:prstGeom>
+          <a:solidFill>
+            <a:schemeClr val="tx1"/>
+          </a:solidFill>
+          <a:ln>
+            <a:solidFill>
+              <a:schemeClr val="tx1"/>
+            </a:solidFill>
+          </a:ln>
+        </p:spPr>
+        <p:style>
+          <a:lnRef idx="2">
+            <a:schemeClr val="accent1">
+              <a:shade val="50000"/>
+            </a:schemeClr>
+          </a:lnRef>
+          <a:fillRef idx="1">
+            <a:schemeClr val="accent1"/>
+          </a:fillRef>
+          <a:effectRef idx="0">
+            <a:schemeClr val="accent1"/>
+          </a:effectRef>
+          <a:fontRef idx="minor">
+            <a:schemeClr val="lt1"/>
+          </a:fontRef>
+        </p:style>
+        <p:txBody>
+          <a:bodyPr rtlCol="0" anchor="ctr"/>
+          <a:lstStyle/>
+          <a:p>
+            <a:pPr algn="ctr"/>
+            <a:endParaRPr lang="en-US"/>
+          </a:p>
+        </p:txBody>
+      </p:sp>
+      <p:cxnSp>
+        <p:nvCxnSpPr>
+          <p:cNvPr id="28" name="Elbow Connector 27">
+            <a:extLst>
+              <a:ext uri="{FF2B5EF4-FFF2-40B4-BE49-F238E27FC236}">
+                <a16:creationId xmlns:a16="http://schemas.microsoft.com/office/drawing/2014/main" id="{796A50DC-3C85-C749-BCE1-AE43C41F390A}"/>
+              </a:ext>
+            </a:extLst>
+          </p:cNvPr>
+          <p:cNvCxnSpPr>
+            <a:cxnSpLocks/>
+            <a:stCxn id="5" idx="3"/>
+            <a:endCxn id="22" idx="1"/>
+          </p:cNvCxnSpPr>
+          <p:nvPr/>
+        </p:nvCxnSpPr>
+        <p:spPr>
+          <a:xfrm flipV="1">
+            <a:off x="8225766" y="1319705"/>
+            <a:ext cx="1649557" cy="2002010"/>
+          </a:xfrm>
+          <a:prstGeom prst="bentConnector3">
+            <a:avLst>
+              <a:gd name="adj1" fmla="val 50000"/>
+            </a:avLst>
+          </a:prstGeom>
+          <a:ln w="101600">
+            <a:solidFill>
+              <a:schemeClr val="tx1"/>
+            </a:solidFill>
+            <a:tailEnd type="triangle"/>
+          </a:ln>
+        </p:spPr>
+        <p:style>
+          <a:lnRef idx="1">
+            <a:schemeClr val="accent1"/>
+          </a:lnRef>
+          <a:fillRef idx="0">
+            <a:schemeClr val="accent1"/>
+          </a:fillRef>
+          <a:effectRef idx="0">
+            <a:schemeClr val="accent1"/>
+          </a:effectRef>
+          <a:fontRef idx="minor">
+            <a:schemeClr val="tx1"/>
+          </a:fontRef>
+        </p:style>
+      </p:cxnSp>
+      <p:cxnSp>
+        <p:nvCxnSpPr>
+          <p:cNvPr id="29" name="Elbow Connector 28">
+            <a:extLst>
+              <a:ext uri="{FF2B5EF4-FFF2-40B4-BE49-F238E27FC236}">
+                <a16:creationId xmlns:a16="http://schemas.microsoft.com/office/drawing/2014/main" id="{C3764779-F25E-B148-8E1F-B2AA7AF1D344}"/>
+              </a:ext>
+            </a:extLst>
+          </p:cNvPr>
+          <p:cNvCxnSpPr>
+            <a:cxnSpLocks/>
+            <a:stCxn id="5" idx="3"/>
+            <a:endCxn id="23" idx="1"/>
+          </p:cNvCxnSpPr>
+          <p:nvPr/>
+        </p:nvCxnSpPr>
+        <p:spPr>
+          <a:xfrm>
+            <a:off x="8225766" y="3321715"/>
+            <a:ext cx="1638230" cy="2232842"/>
+          </a:xfrm>
+          <a:prstGeom prst="bentConnector3">
+            <a:avLst>
+              <a:gd name="adj1" fmla="val 50000"/>
+            </a:avLst>
+          </a:prstGeom>
+          <a:ln w="101600">
+            <a:solidFill>
+              <a:schemeClr val="tx1"/>
+            </a:solidFill>
+            <a:tailEnd type="triangle"/>
+          </a:ln>
+        </p:spPr>
+        <p:style>
+          <a:lnRef idx="1">
+            <a:schemeClr val="accent1"/>
+          </a:lnRef>
+          <a:fillRef idx="0">
+            <a:schemeClr val="accent1"/>
+          </a:fillRef>
+          <a:effectRef idx="0">
+            <a:schemeClr val="accent1"/>
+          </a:effectRef>
+          <a:fontRef idx="minor">
+            <a:schemeClr val="tx1"/>
+          </a:fontRef>
+        </p:style>
+      </p:cxnSp>
+      <p:sp>
+        <p:nvSpPr>
+          <p:cNvPr id="32" name="TextBox 31">
+            <a:extLst>
+              <a:ext uri="{FF2B5EF4-FFF2-40B4-BE49-F238E27FC236}">
+                <a16:creationId xmlns:a16="http://schemas.microsoft.com/office/drawing/2014/main" id="{5730E936-B05D-AD45-9F99-C5C533958A5E}"/>
+              </a:ext>
+            </a:extLst>
+          </p:cNvPr>
+          <p:cNvSpPr txBox="1"/>
+          <p:nvPr/>
+        </p:nvSpPr>
+        <p:spPr>
+          <a:xfrm>
+            <a:off x="10156972" y="727524"/>
+            <a:ext cx="1654620" cy="1200329"/>
+          </a:xfrm>
+          <a:prstGeom prst="rect">
+            <a:avLst/>
+          </a:prstGeom>
+          <a:noFill/>
+        </p:spPr>
+        <p:txBody>
+          <a:bodyPr wrap="none" rtlCol="0">
+            <a:spAutoFit/>
+          </a:bodyPr>
+          <a:lstStyle/>
+          <a:p>
+            <a:r>
+              <a:rPr lang="en-US" sz="2400" dirty="0">
+                <a:latin typeface="Lato" panose="020F0502020204030203" pitchFamily="34" charset="0"/>
+                <a:ea typeface="Lato" panose="020F0502020204030203" pitchFamily="34" charset="0"/>
+                <a:cs typeface="Lato" panose="020F0502020204030203" pitchFamily="34" charset="0"/>
+              </a:rPr>
+              <a:t>0: Fraud</a:t>
+            </a:r>
+          </a:p>
+          <a:p>
+            <a:r>
+              <a:rPr lang="en-US" sz="2400" dirty="0">
+                <a:latin typeface="Lato" panose="020F0502020204030203" pitchFamily="34" charset="0"/>
+                <a:ea typeface="Lato" panose="020F0502020204030203" pitchFamily="34" charset="0"/>
+                <a:cs typeface="Lato" panose="020F0502020204030203" pitchFamily="34" charset="0"/>
+              </a:rPr>
+              <a:t>1: Genuine</a:t>
+            </a:r>
+          </a:p>
+          <a:p>
+            <a:r>
+              <a:rPr lang="en-US" sz="2400" dirty="0">
+                <a:latin typeface="Lato" panose="020F0502020204030203" pitchFamily="34" charset="0"/>
+                <a:ea typeface="Lato" panose="020F0502020204030203" pitchFamily="34" charset="0"/>
+                <a:cs typeface="Lato" panose="020F0502020204030203" pitchFamily="34" charset="0"/>
+              </a:rPr>
+              <a:t>2: Fake</a:t>
+            </a:r>
+          </a:p>
+        </p:txBody>
+      </p:sp>
+      <p:sp>
+        <p:nvSpPr>
+          <p:cNvPr id="34" name="TextBox 33">
+            <a:extLst>
+              <a:ext uri="{FF2B5EF4-FFF2-40B4-BE49-F238E27FC236}">
+                <a16:creationId xmlns:a16="http://schemas.microsoft.com/office/drawing/2014/main" id="{A4A5890B-EB8A-9C46-95CF-BC543130BAA4}"/>
+              </a:ext>
+            </a:extLst>
+          </p:cNvPr>
+          <p:cNvSpPr txBox="1"/>
+          <p:nvPr/>
+        </p:nvSpPr>
+        <p:spPr>
+          <a:xfrm>
+            <a:off x="10220931" y="5323723"/>
+            <a:ext cx="763351" cy="461665"/>
+          </a:xfrm>
+          <a:prstGeom prst="rect">
+            <a:avLst/>
+          </a:prstGeom>
+          <a:noFill/>
+        </p:spPr>
+        <p:txBody>
+          <a:bodyPr wrap="none" rtlCol="0">
+            <a:spAutoFit/>
+          </a:bodyPr>
+          <a:lstStyle/>
+          <a:p>
+            <a:r>
+              <a:rPr lang="en-US" sz="2400" dirty="0">
+                <a:latin typeface="Lato" panose="020F0502020204030203" pitchFamily="34" charset="0"/>
+                <a:ea typeface="Lato" panose="020F0502020204030203" pitchFamily="34" charset="0"/>
+                <a:cs typeface="Lato" panose="020F0502020204030203" pitchFamily="34" charset="0"/>
+              </a:rPr>
+              <a:t>Real</a:t>
+            </a:r>
+          </a:p>
+        </p:txBody>
+      </p:sp>
+    </p:spTree>
+    <p:extLst>
+      <p:ext uri="{BB962C8B-B14F-4D97-AF65-F5344CB8AC3E}">
+        <p14:creationId xmlns:p14="http://schemas.microsoft.com/office/powerpoint/2010/main" val="493937057"/>
+      </p:ext>
+    </p:extLst>
+  </p:cSld>
+  <p:clrMapOvr>
+    <a:masterClrMapping/>
+  </p:clrMapOvr>
+</p:sld>
+</file>
+
 <file path=ppt/theme/theme1.xml><?xml version="1.0" encoding="utf-8"?>
 <a:theme xmlns:a="http://schemas.openxmlformats.org/drawingml/2006/main" name="Office Theme">
   <a:themeElements>

</xml_diff>